<commit_message>
Removed stray build files
</commit_message>
<xml_diff>
--- a/About.pptx
+++ b/About.pptx
@@ -5998,17 +5998,8 @@
               <a:rPr lang="en-IN" dirty="0">
                 <a:latin typeface="Orbitron" pitchFamily="2" charset="0"/>
               </a:rPr>
-              <a:t>Press Escape to return to </a:t>
-            </a:r>
-            <a:r>
-              <a:rPr lang="en-IN">
-                <a:latin typeface="Orbitron" pitchFamily="2" charset="0"/>
-              </a:rPr>
-              <a:t>the main menu</a:t>
-            </a:r>
-            <a:endParaRPr lang="en-IN" dirty="0">
-              <a:latin typeface="Orbitron" pitchFamily="2" charset="0"/>
-            </a:endParaRPr>
+              <a:t>Press Escape to return to the main menu</a:t>
+            </a:r>
           </a:p>
         </p:txBody>
       </p:sp>

</xml_diff>